<commit_message>
make changes to the ppts
</commit_message>
<xml_diff>
--- a/plans/邱来-15196116.pptx
+++ b/plans/邱来-15196116.pptx
@@ -6,10 +6,11 @@
   </p:sldMasterIdLst>
   <p:sldIdLst>
     <p:sldId id="267" r:id="rId3"/>
-    <p:sldId id="268" r:id="rId4"/>
-    <p:sldId id="269" r:id="rId5"/>
-    <p:sldId id="270" r:id="rId6"/>
-    <p:sldId id="272" r:id="rId7"/>
+    <p:sldId id="273" r:id="rId4"/>
+    <p:sldId id="268" r:id="rId5"/>
+    <p:sldId id="269" r:id="rId6"/>
+    <p:sldId id="270" r:id="rId7"/>
+    <p:sldId id="272" r:id="rId8"/>
   </p:sldIdLst>
   <p:sldSz cx="9144000" cy="6858000" type="screen4x3"/>
   <p:notesSz cx="6858000" cy="9144000"/>
@@ -4079,7 +4080,7 @@
           <a:p>
             <a:pPr algn="l"/>
             <a:r>
-              <a:rPr lang="zh-CN" altLang="en-US" sz="4000" b="1" dirty="0" smtClean="0">
+              <a:rPr lang="en-US" altLang="zh-CN" sz="4000" b="1" dirty="0">
                 <a:solidFill>
                   <a:schemeClr val="tx1">
                     <a:lumMod val="65000"/>
@@ -4089,35 +4090,9 @@
                 <a:latin typeface="微软雅黑" panose="020B0503020204020204" pitchFamily="34" charset="-122"/>
                 <a:ea typeface="微软雅黑" panose="020B0503020204020204" pitchFamily="34" charset="-122"/>
               </a:rPr>
-              <a:t>职业生涯规划</a:t>
-            </a:r>
-            <a:r>
-              <a:rPr lang="en-US" altLang="zh-CN" sz="4000" b="1" dirty="0" smtClean="0">
-                <a:solidFill>
-                  <a:schemeClr val="tx1">
-                    <a:lumMod val="65000"/>
-                    <a:lumOff val="35000"/>
-                  </a:schemeClr>
-                </a:solidFill>
-                <a:latin typeface="微软雅黑" panose="020B0503020204020204" pitchFamily="34" charset="-122"/>
-                <a:ea typeface="微软雅黑" panose="020B0503020204020204" pitchFamily="34" charset="-122"/>
-              </a:rPr>
-              <a:t>PPT</a:t>
-            </a:r>
-            <a:r>
-              <a:rPr lang="zh-CN" altLang="en-US" sz="4000" b="1" dirty="0" smtClean="0">
-                <a:solidFill>
-                  <a:schemeClr val="tx1">
-                    <a:lumMod val="65000"/>
-                    <a:lumOff val="35000"/>
-                  </a:schemeClr>
-                </a:solidFill>
-                <a:latin typeface="微软雅黑" panose="020B0503020204020204" pitchFamily="34" charset="-122"/>
-                <a:ea typeface="微软雅黑" panose="020B0503020204020204" pitchFamily="34" charset="-122"/>
-              </a:rPr>
-              <a:t>汇总</a:t>
-            </a:r>
-            <a:endParaRPr lang="zh-CN" altLang="en-US" sz="4000" b="1" dirty="0">
+              <a:t>Career Planning</a:t>
+            </a:r>
+            <a:endParaRPr lang="en-US" altLang="zh-CN" sz="4000" b="1" dirty="0">
               <a:solidFill>
                 <a:schemeClr val="tx1">
                   <a:lumMod val="65000"/>
@@ -4250,53 +4225,13 @@
       </p:sp>
       <p:sp>
         <p:nvSpPr>
-          <p:cNvPr id="31" name="TextBox 30"/>
-          <p:cNvSpPr txBox="1"/>
-          <p:nvPr/>
-        </p:nvSpPr>
-        <p:spPr>
-          <a:xfrm>
-            <a:off x="246876" y="6289575"/>
-            <a:ext cx="1667444" cy="307777"/>
-          </a:xfrm>
-          <a:prstGeom prst="rect">
-            <a:avLst/>
-          </a:prstGeom>
-          <a:noFill/>
-        </p:spPr>
-        <p:txBody>
-          <a:bodyPr wrap="none" rtlCol="0">
-            <a:spAutoFit/>
-          </a:bodyPr>
-          <a:lstStyle/>
-          <a:p>
-            <a:r>
-              <a:rPr lang="en-US" altLang="zh-CN" sz="1400" dirty="0" smtClean="0">
-                <a:solidFill>
-                  <a:schemeClr val="bg1"/>
-                </a:solidFill>
-                <a:latin typeface="Mistral" pitchFamily="66" charset="0"/>
-              </a:rPr>
-              <a:t>Yvonne’s Career Planning</a:t>
-            </a:r>
-            <a:endParaRPr lang="zh-CN" altLang="en-US" sz="1400" dirty="0">
-              <a:solidFill>
-                <a:schemeClr val="bg1"/>
-              </a:solidFill>
-              <a:latin typeface="Mistral" pitchFamily="66" charset="0"/>
-            </a:endParaRPr>
-          </a:p>
-        </p:txBody>
-      </p:sp>
-      <p:sp>
-        <p:nvSpPr>
           <p:cNvPr id="23" name="TextBox 22"/>
           <p:cNvSpPr txBox="1"/>
           <p:nvPr/>
         </p:nvSpPr>
         <p:spPr>
           <a:xfrm>
-            <a:off x="285720" y="4149080"/>
+            <a:off x="2510125" y="5655935"/>
             <a:ext cx="7886680" cy="671830"/>
           </a:xfrm>
           <a:prstGeom prst="rect">
@@ -4325,7 +4260,7 @@
                 <a:latin typeface="微软雅黑" panose="020B0503020204020204" pitchFamily="34" charset="-122"/>
                 <a:ea typeface="微软雅黑" panose="020B0503020204020204" pitchFamily="34" charset="-122"/>
               </a:rPr>
-              <a:t>1</a:t>
+              <a:t>--By </a:t>
             </a:r>
             <a:r>
               <a:rPr lang="zh-CN" altLang="en-US" sz="3600" spc="300" dirty="0" smtClean="0">
@@ -4337,7 +4272,7 @@
                 <a:latin typeface="微软雅黑" panose="020B0503020204020204" pitchFamily="34" charset="-122"/>
                 <a:ea typeface="微软雅黑" panose="020B0503020204020204" pitchFamily="34" charset="-122"/>
               </a:rPr>
-              <a:t>、</a:t>
+              <a:t>邱来</a:t>
             </a:r>
             <a:r>
               <a:rPr lang="en-US" altLang="zh-CN" sz="3600" spc="300" dirty="0" smtClean="0">
@@ -4349,45 +4284,9 @@
                 <a:latin typeface="微软雅黑" panose="020B0503020204020204" pitchFamily="34" charset="-122"/>
                 <a:ea typeface="微软雅黑" panose="020B0503020204020204" pitchFamily="34" charset="-122"/>
               </a:rPr>
-              <a:t>× × ×</a:t>
-            </a:r>
-            <a:r>
-              <a:rPr lang="zh-CN" altLang="en-US" sz="3600" spc="300" dirty="0" smtClean="0">
-                <a:solidFill>
-                  <a:schemeClr val="bg1">
-                    <a:lumMod val="95000"/>
-                  </a:schemeClr>
-                </a:solidFill>
-                <a:latin typeface="微软雅黑" panose="020B0503020204020204" pitchFamily="34" charset="-122"/>
-                <a:ea typeface="微软雅黑" panose="020B0503020204020204" pitchFamily="34" charset="-122"/>
-              </a:rPr>
-              <a:t>职业定位是</a:t>
-            </a:r>
-            <a:r>
-              <a:rPr lang="en-US" altLang="zh-CN" sz="3600" spc="300" dirty="0" smtClean="0">
-                <a:solidFill>
-                  <a:schemeClr val="bg1">
-                    <a:lumMod val="95000"/>
-                  </a:schemeClr>
-                </a:solidFill>
-                <a:latin typeface="微软雅黑" panose="020B0503020204020204" pitchFamily="34" charset="-122"/>
-                <a:ea typeface="微软雅黑" panose="020B0503020204020204" pitchFamily="34" charset="-122"/>
-              </a:rPr>
-              <a:t>:</a:t>
-            </a:r>
-            <a:r>
-              <a:rPr lang="zh-CN" altLang="zh-CN" sz="3600" spc="300" dirty="0" smtClean="0">
-                <a:solidFill>
-                  <a:schemeClr val="bg1">
-                    <a:lumMod val="95000"/>
-                  </a:schemeClr>
-                </a:solidFill>
-                <a:latin typeface="微软雅黑" panose="020B0503020204020204" pitchFamily="34" charset="-122"/>
-                <a:ea typeface="微软雅黑" panose="020B0503020204020204" pitchFamily="34" charset="-122"/>
-              </a:rPr>
-              <a:t>就业</a:t>
-            </a:r>
-            <a:endParaRPr lang="zh-CN" altLang="zh-CN" sz="3600" spc="300" dirty="0" smtClean="0">
+              <a:t>(15196116)</a:t>
+            </a:r>
+            <a:endParaRPr lang="en-US" altLang="zh-CN" sz="3600" spc="300" dirty="0" smtClean="0">
               <a:solidFill>
                 <a:schemeClr val="bg1">
                   <a:lumMod val="95000"/>
@@ -4436,6 +4335,68 @@
       </p:grpSpPr>
       <p:sp>
         <p:nvSpPr>
+          <p:cNvPr id="2" name="标题 1"/>
+          <p:cNvSpPr>
+            <a:spLocks noGrp="1"/>
+          </p:cNvSpPr>
+          <p:nvPr>
+            <p:ph type="ctrTitle"/>
+          </p:nvPr>
+        </p:nvSpPr>
+        <p:spPr>
+          <a:xfrm>
+            <a:off x="323528" y="260648"/>
+            <a:ext cx="7677496" cy="1525278"/>
+          </a:xfrm>
+        </p:spPr>
+        <p:txBody>
+          <a:bodyPr>
+            <a:normAutofit/>
+          </a:bodyPr>
+          <a:lstStyle/>
+          <a:p>
+            <a:pPr algn="l"/>
+            <a:r>
+              <a:rPr lang="en-US" altLang="zh-CN" sz="4000" b="1" dirty="0">
+                <a:solidFill>
+                  <a:schemeClr val="tx1">
+                    <a:lumMod val="65000"/>
+                    <a:lumOff val="35000"/>
+                  </a:schemeClr>
+                </a:solidFill>
+                <a:latin typeface="微软雅黑" panose="020B0503020204020204" pitchFamily="34" charset="-122"/>
+                <a:ea typeface="微软雅黑" panose="020B0503020204020204" pitchFamily="34" charset="-122"/>
+              </a:rPr>
+              <a:t>SWOT</a:t>
+            </a:r>
+            <a:r>
+              <a:rPr lang="zh-CN" altLang="en-US" sz="4000" b="1" dirty="0">
+                <a:solidFill>
+                  <a:schemeClr val="tx1">
+                    <a:lumMod val="65000"/>
+                    <a:lumOff val="35000"/>
+                  </a:schemeClr>
+                </a:solidFill>
+                <a:latin typeface="微软雅黑" panose="020B0503020204020204" pitchFamily="34" charset="-122"/>
+                <a:ea typeface="微软雅黑" panose="020B0503020204020204" pitchFamily="34" charset="-122"/>
+              </a:rPr>
+              <a:t>测试</a:t>
+            </a:r>
+            <a:endParaRPr lang="zh-CN" altLang="en-US" sz="4000" b="1" dirty="0">
+              <a:solidFill>
+                <a:schemeClr val="tx1">
+                  <a:lumMod val="65000"/>
+                  <a:lumOff val="35000"/>
+                </a:schemeClr>
+              </a:solidFill>
+              <a:latin typeface="微软雅黑" panose="020B0503020204020204" pitchFamily="34" charset="-122"/>
+              <a:ea typeface="微软雅黑" panose="020B0503020204020204" pitchFamily="34" charset="-122"/>
+            </a:endParaRPr>
+          </a:p>
+        </p:txBody>
+      </p:sp>
+      <p:sp>
+        <p:nvSpPr>
           <p:cNvPr id="3" name="副标题 2"/>
           <p:cNvSpPr>
             <a:spLocks noGrp="1"/>
@@ -4444,12 +4405,7 @@
             <p:ph type="subTitle" idx="1"/>
           </p:nvPr>
         </p:nvSpPr>
-        <p:spPr>
-          <a:xfrm>
-            <a:off x="0" y="1142984"/>
-            <a:ext cx="8715404" cy="4500594"/>
-          </a:xfrm>
-        </p:spPr>
+        <p:spPr/>
         <p:txBody>
           <a:bodyPr/>
           <a:lstStyle/>
@@ -4460,20 +4416,23 @@
       </p:sp>
       <p:sp>
         <p:nvSpPr>
-          <p:cNvPr id="28" name="矩形 27"/>
+          <p:cNvPr id="27" name="矩形 26"/>
           <p:cNvSpPr/>
           <p:nvPr/>
         </p:nvSpPr>
         <p:spPr>
           <a:xfrm>
-            <a:off x="0" y="6669360"/>
-            <a:ext cx="9144000" cy="188640"/>
+            <a:off x="0" y="3573016"/>
+            <a:ext cx="9144000" cy="3096344"/>
           </a:xfrm>
           <a:prstGeom prst="rect">
             <a:avLst/>
           </a:prstGeom>
           <a:solidFill>
-            <a:schemeClr val="accent2"/>
+            <a:schemeClr val="tx1">
+              <a:lumMod val="75000"/>
+              <a:lumOff val="25000"/>
+            </a:schemeClr>
           </a:solidFill>
           <a:ln>
             <a:noFill/>
@@ -4500,6 +4459,52 @@
           <a:lstStyle/>
           <a:p>
             <a:pPr algn="ctr"/>
+            <a:endParaRPr lang="zh-CN" altLang="en-US" dirty="0"/>
+          </a:p>
+        </p:txBody>
+      </p:sp>
+      <p:sp>
+        <p:nvSpPr>
+          <p:cNvPr id="28" name="矩形 27"/>
+          <p:cNvSpPr/>
+          <p:nvPr/>
+        </p:nvSpPr>
+        <p:spPr>
+          <a:xfrm>
+            <a:off x="0" y="6669360"/>
+            <a:ext cx="9144000" cy="188640"/>
+          </a:xfrm>
+          <a:prstGeom prst="rect">
+            <a:avLst/>
+          </a:prstGeom>
+          <a:solidFill>
+            <a:schemeClr val="accent2"/>
+          </a:solidFill>
+          <a:ln>
+            <a:noFill/>
+          </a:ln>
+        </p:spPr>
+        <p:style>
+          <a:lnRef idx="2">
+            <a:schemeClr val="accent1">
+              <a:shade val="50000"/>
+            </a:schemeClr>
+          </a:lnRef>
+          <a:fillRef idx="1">
+            <a:schemeClr val="accent1"/>
+          </a:fillRef>
+          <a:effectRef idx="0">
+            <a:schemeClr val="accent1"/>
+          </a:effectRef>
+          <a:fontRef idx="minor">
+            <a:schemeClr val="lt1"/>
+          </a:fontRef>
+        </p:style>
+        <p:txBody>
+          <a:bodyPr rtlCol="0" anchor="ctr"/>
+          <a:lstStyle/>
+          <a:p>
+            <a:pPr algn="ctr"/>
             <a:endParaRPr lang="zh-CN" altLang="en-US">
               <a:solidFill>
                 <a:schemeClr val="accent2"/>
@@ -4510,14 +4515,14 @@
       </p:sp>
       <p:sp>
         <p:nvSpPr>
-          <p:cNvPr id="31" name="TextBox 30"/>
+          <p:cNvPr id="23" name="TextBox 22"/>
           <p:cNvSpPr txBox="1"/>
           <p:nvPr/>
         </p:nvSpPr>
         <p:spPr>
           <a:xfrm>
-            <a:off x="246876" y="6289575"/>
-            <a:ext cx="1667444" cy="307777"/>
+            <a:off x="-637570" y="4010650"/>
+            <a:ext cx="7886680" cy="12863830"/>
           </a:xfrm>
           <a:prstGeom prst="rect">
             <a:avLst/>
@@ -4525,128 +4530,369 @@
           <a:noFill/>
         </p:spPr>
         <p:txBody>
-          <a:bodyPr wrap="none" rtlCol="0">
+          <a:bodyPr wrap="square" rtlCol="0">
             <a:spAutoFit/>
           </a:bodyPr>
           <a:lstStyle/>
           <a:p>
-            <a:r>
-              <a:rPr lang="en-US" altLang="zh-CN" sz="1400" dirty="0" smtClean="0">
-                <a:solidFill>
-                  <a:schemeClr val="bg1"/>
-                </a:solidFill>
-                <a:latin typeface="Mistral" pitchFamily="66" charset="0"/>
+            <a:pPr algn="ctr">
+              <a:lnSpc>
+                <a:spcPts val="4000"/>
+              </a:lnSpc>
+            </a:pPr>
+            <a:r>
+              <a:rPr lang="en-US" altLang="zh-CN" sz="3600" spc="300" dirty="0" smtClean="0">
+                <a:solidFill>
+                  <a:schemeClr val="bg1">
+                    <a:lumMod val="95000"/>
+                  </a:schemeClr>
+                </a:solidFill>
+                <a:latin typeface="微软雅黑" panose="020B0503020204020204" pitchFamily="34" charset="-122"/>
+                <a:ea typeface="微软雅黑" panose="020B0503020204020204" pitchFamily="34" charset="-122"/>
               </a:rPr>
-              <a:t>Yvonne’s Career Planning</a:t>
-            </a:r>
-            <a:endParaRPr lang="zh-CN" altLang="en-US" sz="1400" dirty="0">
+              <a:t>Strengths</a:t>
+            </a:r>
+            <a:r>
+              <a:rPr lang="zh-CN" altLang="en-US" sz="3600" spc="300" dirty="0" smtClean="0">
+                <a:solidFill>
+                  <a:schemeClr val="bg1">
+                    <a:lumMod val="95000"/>
+                  </a:schemeClr>
+                </a:solidFill>
+                <a:latin typeface="微软雅黑" panose="020B0503020204020204" pitchFamily="34" charset="-122"/>
+                <a:ea typeface="微软雅黑" panose="020B0503020204020204" pitchFamily="34" charset="-122"/>
+              </a:rPr>
+              <a:t>：</a:t>
+            </a:r>
+            <a:endParaRPr lang="zh-CN" altLang="en-US" sz="3600" spc="300" dirty="0" smtClean="0">
               <a:solidFill>
-                <a:schemeClr val="bg1"/>
+                <a:schemeClr val="bg1">
+                  <a:lumMod val="95000"/>
+                </a:schemeClr>
               </a:solidFill>
-              <a:latin typeface="Mistral" pitchFamily="66" charset="0"/>
+              <a:latin typeface="微软雅黑" panose="020B0503020204020204" pitchFamily="34" charset="-122"/>
+              <a:ea typeface="微软雅黑" panose="020B0503020204020204" pitchFamily="34" charset="-122"/>
             </a:endParaRPr>
           </a:p>
-        </p:txBody>
-      </p:sp>
-      <p:pic>
-        <p:nvPicPr>
-          <p:cNvPr id="53" name="Imagen 3" descr="C:\Users\Design\Documents\Edu\Product Launch\magic_wand.png"/>
-          <p:cNvPicPr>
-            <a:picLocks noChangeAspect="1" noChangeArrowheads="1"/>
-          </p:cNvPicPr>
+          <a:p>
+            <a:pPr algn="ctr">
+              <a:lnSpc>
+                <a:spcPts val="4000"/>
+              </a:lnSpc>
+            </a:pPr>
+            <a:r>
+              <a:rPr lang="en-US" altLang="zh-CN" sz="3600" spc="300" dirty="0" smtClean="0">
+                <a:solidFill>
+                  <a:schemeClr val="bg1">
+                    <a:lumMod val="95000"/>
+                  </a:schemeClr>
+                </a:solidFill>
+                <a:latin typeface="微软雅黑" panose="020B0503020204020204" pitchFamily="34" charset="-122"/>
+                <a:ea typeface="微软雅黑" panose="020B0503020204020204" pitchFamily="34" charset="-122"/>
+              </a:rPr>
+              <a:t>	</a:t>
+            </a:r>
+            <a:r>
+              <a:rPr lang="zh-CN" altLang="en-US" sz="3600" spc="300" dirty="0" smtClean="0">
+                <a:solidFill>
+                  <a:schemeClr val="bg1">
+                    <a:lumMod val="95000"/>
+                  </a:schemeClr>
+                </a:solidFill>
+                <a:latin typeface="微软雅黑" panose="020B0503020204020204" pitchFamily="34" charset="-122"/>
+                <a:ea typeface="微软雅黑" panose="020B0503020204020204" pitchFamily="34" charset="-122"/>
+              </a:rPr>
+              <a:t>自己而言：对计算机服务集群的部署，维护和开发有浓厚的兴趣和一定的开发经验</a:t>
+            </a:r>
+            <a:endParaRPr lang="zh-CN" altLang="en-US" sz="3600" spc="300" dirty="0" smtClean="0">
+              <a:solidFill>
+                <a:schemeClr val="bg1">
+                  <a:lumMod val="95000"/>
+                </a:schemeClr>
+              </a:solidFill>
+              <a:latin typeface="微软雅黑" panose="020B0503020204020204" pitchFamily="34" charset="-122"/>
+              <a:ea typeface="微软雅黑" panose="020B0503020204020204" pitchFamily="34" charset="-122"/>
+            </a:endParaRPr>
+          </a:p>
+          <a:p>
+            <a:pPr algn="ctr">
+              <a:lnSpc>
+                <a:spcPts val="4000"/>
+              </a:lnSpc>
+            </a:pPr>
+            <a:r>
+              <a:rPr lang="zh-CN" altLang="en-US" sz="3600" spc="300" dirty="0" smtClean="0">
+                <a:solidFill>
+                  <a:schemeClr val="bg1">
+                    <a:lumMod val="95000"/>
+                  </a:schemeClr>
+                </a:solidFill>
+                <a:latin typeface="微软雅黑" panose="020B0503020204020204" pitchFamily="34" charset="-122"/>
+                <a:ea typeface="微软雅黑" panose="020B0503020204020204" pitchFamily="34" charset="-122"/>
+              </a:rPr>
+              <a:t>外界的因素：</a:t>
+            </a:r>
+            <a:endParaRPr lang="zh-CN" altLang="en-US" sz="3600" spc="300" dirty="0" smtClean="0">
+              <a:solidFill>
+                <a:schemeClr val="bg1">
+                  <a:lumMod val="95000"/>
+                </a:schemeClr>
+              </a:solidFill>
+              <a:latin typeface="微软雅黑" panose="020B0503020204020204" pitchFamily="34" charset="-122"/>
+              <a:ea typeface="微软雅黑" panose="020B0503020204020204" pitchFamily="34" charset="-122"/>
+            </a:endParaRPr>
+          </a:p>
+          <a:p>
+            <a:pPr algn="ctr">
+              <a:lnSpc>
+                <a:spcPts val="4000"/>
+              </a:lnSpc>
+            </a:pPr>
+            <a:r>
+              <a:rPr lang="zh-CN" altLang="en-US" sz="3600" spc="300" dirty="0" smtClean="0">
+                <a:solidFill>
+                  <a:schemeClr val="bg1">
+                    <a:lumMod val="95000"/>
+                  </a:schemeClr>
+                </a:solidFill>
+                <a:latin typeface="微软雅黑" panose="020B0503020204020204" pitchFamily="34" charset="-122"/>
+                <a:ea typeface="微软雅黑" panose="020B0503020204020204" pitchFamily="34" charset="-122"/>
+              </a:rPr>
+              <a:t>杭电计算机云计算中心师资实力较强</a:t>
+            </a:r>
+            <a:endParaRPr lang="zh-CN" altLang="en-US" sz="3600" spc="300" dirty="0" smtClean="0">
+              <a:solidFill>
+                <a:schemeClr val="bg1">
+                  <a:lumMod val="95000"/>
+                </a:schemeClr>
+              </a:solidFill>
+              <a:latin typeface="微软雅黑" panose="020B0503020204020204" pitchFamily="34" charset="-122"/>
+              <a:ea typeface="微软雅黑" panose="020B0503020204020204" pitchFamily="34" charset="-122"/>
+            </a:endParaRPr>
+          </a:p>
+          <a:p>
+            <a:pPr algn="ctr">
+              <a:lnSpc>
+                <a:spcPts val="4000"/>
+              </a:lnSpc>
+            </a:pPr>
+            <a:r>
+              <a:rPr lang="en-US" altLang="zh-CN" sz="3600" spc="300" dirty="0" smtClean="0">
+                <a:solidFill>
+                  <a:schemeClr val="bg1">
+                    <a:lumMod val="95000"/>
+                  </a:schemeClr>
+                </a:solidFill>
+                <a:latin typeface="微软雅黑" panose="020B0503020204020204" pitchFamily="34" charset="-122"/>
+                <a:ea typeface="微软雅黑" panose="020B0503020204020204" pitchFamily="34" charset="-122"/>
+              </a:rPr>
+              <a:t>Weeknesses</a:t>
+            </a:r>
+            <a:r>
+              <a:rPr lang="zh-CN" altLang="en-US" sz="3600" spc="300" dirty="0" smtClean="0">
+                <a:solidFill>
+                  <a:schemeClr val="bg1">
+                    <a:lumMod val="95000"/>
+                  </a:schemeClr>
+                </a:solidFill>
+                <a:latin typeface="微软雅黑" panose="020B0503020204020204" pitchFamily="34" charset="-122"/>
+                <a:ea typeface="微软雅黑" panose="020B0503020204020204" pitchFamily="34" charset="-122"/>
+              </a:rPr>
+              <a:t>：</a:t>
+            </a:r>
+            <a:br>
+              <a:rPr lang="zh-CN" altLang="en-US" sz="3600" spc="300" dirty="0" smtClean="0">
+                <a:solidFill>
+                  <a:schemeClr val="bg1">
+                    <a:lumMod val="95000"/>
+                  </a:schemeClr>
+                </a:solidFill>
+                <a:latin typeface="微软雅黑" panose="020B0503020204020204" pitchFamily="34" charset="-122"/>
+                <a:ea typeface="微软雅黑" panose="020B0503020204020204" pitchFamily="34" charset="-122"/>
+              </a:rPr>
+            </a:br>
+            <a:r>
+              <a:rPr lang="zh-CN" altLang="en-US" sz="3600" spc="300" dirty="0" smtClean="0">
+                <a:solidFill>
+                  <a:schemeClr val="bg1">
+                    <a:lumMod val="95000"/>
+                  </a:schemeClr>
+                </a:solidFill>
+                <a:latin typeface="微软雅黑" panose="020B0503020204020204" pitchFamily="34" charset="-122"/>
+                <a:ea typeface="微软雅黑" panose="020B0503020204020204" pitchFamily="34" charset="-122"/>
+              </a:rPr>
+              <a:t>自己搭建服务平台需要的物理硬件的资源较为昂贵，需要学习种类很多；本科出去直接工作的话，但是大型公司</a:t>
+            </a:r>
+            <a:r>
+              <a:rPr lang="zh-CN" altLang="en-US" sz="3600" spc="300" dirty="0" smtClean="0">
+                <a:solidFill>
+                  <a:schemeClr val="bg1">
+                    <a:lumMod val="95000"/>
+                  </a:schemeClr>
+                </a:solidFill>
+                <a:latin typeface="微软雅黑" panose="020B0503020204020204" pitchFamily="34" charset="-122"/>
+                <a:ea typeface="微软雅黑" panose="020B0503020204020204" pitchFamily="34" charset="-122"/>
+              </a:rPr>
+              <a:t>面试需要的开发经验较为丰富的人才</a:t>
+            </a:r>
+            <a:endParaRPr lang="zh-CN" altLang="en-US" sz="3600" spc="300" dirty="0" smtClean="0">
+              <a:solidFill>
+                <a:schemeClr val="bg1">
+                  <a:lumMod val="95000"/>
+                </a:schemeClr>
+              </a:solidFill>
+              <a:latin typeface="微软雅黑" panose="020B0503020204020204" pitchFamily="34" charset="-122"/>
+              <a:ea typeface="微软雅黑" panose="020B0503020204020204" pitchFamily="34" charset="-122"/>
+            </a:endParaRPr>
+          </a:p>
+          <a:p>
+            <a:pPr algn="ctr">
+              <a:lnSpc>
+                <a:spcPts val="4000"/>
+              </a:lnSpc>
+            </a:pPr>
+            <a:r>
+              <a:rPr lang="en-US" altLang="zh-CN" sz="3600" spc="300" dirty="0" smtClean="0">
+                <a:solidFill>
+                  <a:schemeClr val="bg1">
+                    <a:lumMod val="95000"/>
+                  </a:schemeClr>
+                </a:solidFill>
+                <a:latin typeface="微软雅黑" panose="020B0503020204020204" pitchFamily="34" charset="-122"/>
+                <a:ea typeface="微软雅黑" panose="020B0503020204020204" pitchFamily="34" charset="-122"/>
+              </a:rPr>
+              <a:t>Opportunities</a:t>
+            </a:r>
+            <a:r>
+              <a:rPr lang="zh-CN" altLang="en-US" sz="3600" spc="300" dirty="0" smtClean="0">
+                <a:solidFill>
+                  <a:schemeClr val="bg1">
+                    <a:lumMod val="95000"/>
+                  </a:schemeClr>
+                </a:solidFill>
+                <a:latin typeface="微软雅黑" panose="020B0503020204020204" pitchFamily="34" charset="-122"/>
+                <a:ea typeface="微软雅黑" panose="020B0503020204020204" pitchFamily="34" charset="-122"/>
+              </a:rPr>
+              <a:t>：本科出去直接工作的话，可以积累更好的工作经验，为以后的发展打下坚实的基础。</a:t>
+            </a:r>
+            <a:br>
+              <a:rPr lang="zh-CN" altLang="en-US" sz="3600" spc="300" dirty="0" smtClean="0">
+                <a:solidFill>
+                  <a:schemeClr val="bg1">
+                    <a:lumMod val="95000"/>
+                  </a:schemeClr>
+                </a:solidFill>
+                <a:latin typeface="微软雅黑" panose="020B0503020204020204" pitchFamily="34" charset="-122"/>
+                <a:ea typeface="微软雅黑" panose="020B0503020204020204" pitchFamily="34" charset="-122"/>
+              </a:rPr>
+            </a:br>
+            <a:r>
+              <a:rPr lang="zh-CN" altLang="en-US" sz="3600" spc="300" dirty="0" smtClean="0">
+                <a:solidFill>
+                  <a:schemeClr val="bg1">
+                    <a:lumMod val="95000"/>
+                  </a:schemeClr>
+                </a:solidFill>
+                <a:latin typeface="微软雅黑" panose="020B0503020204020204" pitchFamily="34" charset="-122"/>
+                <a:ea typeface="微软雅黑" panose="020B0503020204020204" pitchFamily="34" charset="-122"/>
+              </a:rPr>
+              <a:t>当今社会，对集群提供的计算资源，虚拟化技术人才的很大，部署开发需求很大；云计算平台还需更好的部署工具，同时需要提高效率</a:t>
+            </a:r>
+            <a:endParaRPr lang="zh-CN" altLang="en-US" sz="3600" spc="300" dirty="0" smtClean="0">
+              <a:solidFill>
+                <a:schemeClr val="bg1">
+                  <a:lumMod val="95000"/>
+                </a:schemeClr>
+              </a:solidFill>
+              <a:latin typeface="微软雅黑" panose="020B0503020204020204" pitchFamily="34" charset="-122"/>
+              <a:ea typeface="微软雅黑" panose="020B0503020204020204" pitchFamily="34" charset="-122"/>
+            </a:endParaRPr>
+          </a:p>
+          <a:p>
+            <a:pPr algn="ctr">
+              <a:lnSpc>
+                <a:spcPts val="4000"/>
+              </a:lnSpc>
+            </a:pPr>
+            <a:r>
+              <a:rPr lang="en-US" altLang="zh-CN" sz="3600" spc="300" dirty="0" smtClean="0">
+                <a:solidFill>
+                  <a:schemeClr val="bg1">
+                    <a:lumMod val="95000"/>
+                  </a:schemeClr>
+                </a:solidFill>
+                <a:latin typeface="微软雅黑" panose="020B0503020204020204" pitchFamily="34" charset="-122"/>
+                <a:ea typeface="微软雅黑" panose="020B0503020204020204" pitchFamily="34" charset="-122"/>
+              </a:rPr>
+              <a:t>Threats</a:t>
+            </a:r>
+            <a:r>
+              <a:rPr lang="zh-CN" altLang="en-US" sz="3600" spc="300" dirty="0" smtClean="0">
+                <a:solidFill>
+                  <a:schemeClr val="bg1">
+                    <a:lumMod val="95000"/>
+                  </a:schemeClr>
+                </a:solidFill>
+                <a:latin typeface="微软雅黑" panose="020B0503020204020204" pitchFamily="34" charset="-122"/>
+                <a:ea typeface="微软雅黑" panose="020B0503020204020204" pitchFamily="34" charset="-122"/>
+              </a:rPr>
+              <a:t>：</a:t>
+            </a:r>
+            <a:endParaRPr lang="zh-CN" altLang="en-US" sz="3600" spc="300" dirty="0" smtClean="0">
+              <a:solidFill>
+                <a:schemeClr val="bg1">
+                  <a:lumMod val="95000"/>
+                </a:schemeClr>
+              </a:solidFill>
+              <a:latin typeface="微软雅黑" panose="020B0503020204020204" pitchFamily="34" charset="-122"/>
+              <a:ea typeface="微软雅黑" panose="020B0503020204020204" pitchFamily="34" charset="-122"/>
+            </a:endParaRPr>
+          </a:p>
+          <a:p>
+            <a:pPr algn="ctr">
+              <a:lnSpc>
+                <a:spcPts val="4000"/>
+              </a:lnSpc>
+            </a:pPr>
+            <a:r>
+              <a:rPr lang="zh-CN" altLang="en-US" sz="3600" spc="300" dirty="0" smtClean="0">
+                <a:solidFill>
+                  <a:schemeClr val="bg1">
+                    <a:lumMod val="95000"/>
+                  </a:schemeClr>
+                </a:solidFill>
+                <a:latin typeface="微软雅黑" panose="020B0503020204020204" pitchFamily="34" charset="-122"/>
+                <a:ea typeface="微软雅黑" panose="020B0503020204020204" pitchFamily="34" charset="-122"/>
+              </a:rPr>
+              <a:t>云计算依靠的是巨大的资金支持才能提供更为廉价的计算资源，如果自己从事公司水平不足随时可能面临大型公司的吞并甚至破产的风险</a:t>
+            </a:r>
+            <a:endParaRPr lang="zh-CN" altLang="en-US" sz="3600" spc="300" dirty="0" smtClean="0">
+              <a:solidFill>
+                <a:schemeClr val="bg1">
+                  <a:lumMod val="95000"/>
+                </a:schemeClr>
+              </a:solidFill>
+              <a:latin typeface="微软雅黑" panose="020B0503020204020204" pitchFamily="34" charset="-122"/>
+              <a:ea typeface="微软雅黑" panose="020B0503020204020204" pitchFamily="34" charset="-122"/>
+            </a:endParaRPr>
+          </a:p>
+        </p:txBody>
+      </p:sp>
+      <p:sp>
+        <p:nvSpPr>
+          <p:cNvPr id="6" name="文本框 5"/>
+          <p:cNvSpPr txBox="1"/>
           <p:nvPr/>
-        </p:nvPicPr>
-        <p:blipFill>
-          <a:blip r:embed="rId1" cstate="print">
-            <a:extLst>
-              <a:ext uri="{28A0092B-C50C-407E-A947-70E740481C1C}">
-                <a14:useLocalDpi xmlns:a14="http://schemas.microsoft.com/office/drawing/2010/main" val="0"/>
-              </a:ext>
-            </a:extLst>
-          </a:blip>
-          <a:srcRect/>
-          <a:stretch>
-            <a:fillRect/>
-          </a:stretch>
-        </p:blipFill>
-        <p:spPr bwMode="auto">
-          <a:xfrm>
-            <a:off x="6516216" y="1268760"/>
-            <a:ext cx="457200" cy="457200"/>
+        </p:nvSpPr>
+        <p:spPr>
+          <a:xfrm>
+            <a:off x="2393315" y="3082290"/>
+            <a:ext cx="5440680" cy="365760"/>
           </a:xfrm>
           <a:prstGeom prst="rect">
             <a:avLst/>
           </a:prstGeom>
           <a:noFill/>
-          <a:ln>
-            <a:noFill/>
-          </a:ln>
-          <a:extLst>
-            <a:ext uri="{909E8E84-426E-40DD-AFC4-6F175D3DCCD1}">
-              <a14:hiddenFill xmlns:a14="http://schemas.microsoft.com/office/drawing/2010/main">
-                <a:solidFill>
-                  <a:srgbClr val="FFFFFF"/>
-                </a:solidFill>
-              </a14:hiddenFill>
-            </a:ext>
-            <a:ext uri="{91240B29-F687-4F45-9708-019B960494DF}">
-              <a14:hiddenLine xmlns:a14="http://schemas.microsoft.com/office/drawing/2010/main" w="9525">
-                <a:solidFill>
-                  <a:srgbClr val="000000"/>
-                </a:solidFill>
-                <a:miter lim="800000"/>
-                <a:headEnd/>
-                <a:tailEnd/>
-              </a14:hiddenLine>
-            </a:ext>
-          </a:extLst>
-        </p:spPr>
-      </p:pic>
-      <p:sp>
-        <p:nvSpPr>
-          <p:cNvPr id="9" name="标题 8"/>
-          <p:cNvSpPr>
-            <a:spLocks noGrp="1"/>
-          </p:cNvSpPr>
-          <p:nvPr>
-            <p:ph type="ctrTitle"/>
-          </p:nvPr>
-        </p:nvSpPr>
-        <p:spPr>
-          <a:xfrm>
-            <a:off x="285720" y="428605"/>
-            <a:ext cx="4286280" cy="642941"/>
-          </a:xfrm>
-        </p:spPr>
-        <p:txBody>
-          <a:bodyPr>
-            <a:normAutofit fontScale="90000"/>
-          </a:bodyPr>
-          <a:lstStyle/>
-          <a:p>
-            <a:r>
-              <a:rPr lang="zh-CN" altLang="en-US" dirty="0" smtClean="0"/>
-              <a:t>近期规划（大学阶段）：</a:t>
-            </a:r>
-            <a:endParaRPr lang="zh-CN" altLang="en-US" dirty="0"/>
-          </a:p>
-        </p:txBody>
-      </p:sp>
-      <p:sp>
-        <p:nvSpPr>
-          <p:cNvPr id="2" name="文本框 1"/>
-          <p:cNvSpPr txBox="1"/>
-          <p:nvPr/>
-        </p:nvSpPr>
-        <p:spPr>
-          <a:xfrm>
-            <a:off x="968375" y="1725930"/>
-            <a:ext cx="8322310" cy="3657600"/>
-          </a:xfrm>
-          <a:prstGeom prst="rect">
-            <a:avLst/>
-          </a:prstGeom>
-          <a:noFill/>
         </p:spPr>
         <p:txBody>
           <a:bodyPr wrap="none" rtlCol="0">
@@ -4655,153 +4901,9 @@
           <a:p>
             <a:r>
               <a:rPr lang="zh-CN" altLang="en-US"/>
-              <a:t>中的想法：时间有限，对待学业不求高等水平，中等水平就好</a:t>
-            </a:r>
-            <a:endParaRPr lang="zh-CN" altLang="en-US"/>
-          </a:p>
-          <a:p>
-            <a:r>
-              <a:rPr lang="zh-CN" altLang="en-US"/>
-              <a:t>更多时间在实际的运用开发中</a:t>
-            </a:r>
-            <a:endParaRPr lang="zh-CN" altLang="en-US"/>
-          </a:p>
-          <a:p>
-            <a:r>
-              <a:rPr lang="zh-CN" altLang="en-US"/>
-              <a:t>具体规划：</a:t>
-            </a:r>
-            <a:endParaRPr lang="zh-CN" altLang="en-US"/>
-          </a:p>
-          <a:p>
-            <a:r>
-              <a:rPr lang="zh-CN" altLang="en-US"/>
-              <a:t>大一大三上基本上能够将所有主要的课程选修完成，</a:t>
-            </a:r>
-            <a:endParaRPr lang="zh-CN" altLang="en-US"/>
-          </a:p>
-          <a:p>
-            <a:r>
-              <a:rPr lang="en-US" altLang="zh-CN"/>
-              <a:t>	</a:t>
-            </a:r>
-            <a:r>
-              <a:rPr lang="zh-CN" altLang="en-US"/>
-              <a:t>计网、</a:t>
-            </a:r>
-            <a:r>
-              <a:rPr lang="en-US" altLang="zh-CN"/>
-              <a:t>linux</a:t>
-            </a:r>
-            <a:r>
-              <a:rPr lang="zh-CN" altLang="en-US"/>
-              <a:t>网络编程、</a:t>
-            </a:r>
-            <a:r>
-              <a:rPr lang="en-US" altLang="zh-CN"/>
-              <a:t>linux</a:t>
-            </a:r>
-            <a:r>
-              <a:rPr lang="zh-CN" altLang="en-US"/>
-              <a:t>运用开发、几门公选课</a:t>
-            </a:r>
-            <a:endParaRPr lang="zh-CN" altLang="en-US"/>
-          </a:p>
-          <a:p>
-            <a:r>
-              <a:rPr lang="zh-CN" altLang="en-US"/>
-              <a:t>同时具备基本的企业的工具的使用，</a:t>
-            </a:r>
-            <a:endParaRPr lang="zh-CN" altLang="en-US"/>
-          </a:p>
-          <a:p>
-            <a:r>
-              <a:rPr lang="en-US" altLang="zh-CN"/>
-              <a:t>	</a:t>
-            </a:r>
-            <a:r>
-              <a:rPr lang="zh-CN" altLang="en-US"/>
-              <a:t>编程语言的能力、工具的使用</a:t>
-            </a:r>
-            <a:r>
-              <a:rPr lang="en-US" altLang="zh-CN"/>
-              <a:t>(</a:t>
-            </a:r>
-            <a:r>
-              <a:rPr lang="zh-CN" altLang="en-US"/>
-              <a:t>云平台</a:t>
-            </a:r>
-            <a:r>
-              <a:rPr lang="en-US" altLang="zh-CN"/>
-              <a:t>)</a:t>
-            </a:r>
-            <a:endParaRPr lang="en-US" altLang="zh-CN"/>
-          </a:p>
-          <a:p>
-            <a:r>
-              <a:rPr lang="zh-CN" altLang="en-US"/>
-              <a:t>基本的运用开发的能力</a:t>
-            </a:r>
-            <a:endParaRPr lang="zh-CN" altLang="en-US"/>
-          </a:p>
-          <a:p>
-            <a:r>
-              <a:rPr lang="en-US" altLang="zh-CN"/>
-              <a:t>	</a:t>
-            </a:r>
-            <a:r>
-              <a:rPr lang="zh-CN" altLang="en-US"/>
-              <a:t>制作一些小型的项目、阅读一些高质量的源程序的代码</a:t>
-            </a:r>
-            <a:endParaRPr lang="zh-CN" altLang="en-US"/>
-          </a:p>
-          <a:p>
-            <a:r>
-              <a:rPr lang="zh-CN" altLang="en-US"/>
-              <a:t>大三进入导师实验室进行项目开发工作</a:t>
-            </a:r>
-            <a:endParaRPr lang="zh-CN" altLang="en-US"/>
-          </a:p>
-          <a:p>
-            <a:r>
-              <a:rPr lang="en-US" altLang="zh-CN"/>
-              <a:t>	</a:t>
-            </a:r>
-            <a:r>
-              <a:rPr lang="zh-CN" altLang="en-US"/>
-              <a:t>主要是从事云计算方面、网易公司合作或者是实习</a:t>
-            </a:r>
-            <a:endParaRPr lang="zh-CN" altLang="en-US"/>
-          </a:p>
-          <a:p>
-            <a:r>
-              <a:rPr lang="zh-CN" altLang="en-US"/>
-              <a:t>大四进入企业实习</a:t>
-            </a:r>
-            <a:endParaRPr lang="zh-CN" altLang="en-US"/>
-          </a:p>
-          <a:p>
-            <a:r>
-              <a:rPr lang="en-US" altLang="zh-CN"/>
-              <a:t>	</a:t>
-            </a:r>
-            <a:r>
-              <a:rPr lang="zh-CN" altLang="en-US"/>
-              <a:t>留在网易，不行的话选择一些国内的云平台</a:t>
-            </a:r>
-            <a:r>
-              <a:rPr lang="en-US" altLang="zh-CN"/>
-              <a:t>(</a:t>
-            </a:r>
-            <a:r>
-              <a:rPr lang="zh-CN" altLang="en-US"/>
-              <a:t>阿里、九州云、青云之类的</a:t>
-            </a:r>
-            <a:r>
-              <a:rPr lang="en-US" altLang="zh-CN"/>
-              <a:t>)</a:t>
-            </a:r>
-            <a:endParaRPr lang="en-US" altLang="zh-CN"/>
+              <a:t>自己的职业取向：从事云计算平台的维护和开发职业</a:t>
+            </a:r>
+            <a:endParaRPr lang="zh-CN" altLang="en-US"/>
           </a:p>
         </p:txBody>
       </p:sp>
@@ -5032,7 +5134,7 @@
           <a:p>
             <a:r>
               <a:rPr lang="zh-CN" altLang="en-US" dirty="0" smtClean="0"/>
-              <a:t>中期规划（工作前三四年的样子）：</a:t>
+              <a:t>近期规划（大学阶段）：</a:t>
             </a:r>
             <a:endParaRPr lang="zh-CN" altLang="en-US" dirty="0"/>
           </a:p>
@@ -5040,14 +5142,14 @@
       </p:sp>
       <p:sp>
         <p:nvSpPr>
-          <p:cNvPr id="4" name="文本框 3"/>
+          <p:cNvPr id="2" name="文本框 1"/>
           <p:cNvSpPr txBox="1"/>
           <p:nvPr/>
         </p:nvSpPr>
         <p:spPr>
           <a:xfrm>
-            <a:off x="1705610" y="2473960"/>
-            <a:ext cx="5963285" cy="2286000"/>
+            <a:off x="968375" y="1725930"/>
+            <a:ext cx="8322310" cy="3657600"/>
           </a:xfrm>
           <a:prstGeom prst="rect">
             <a:avLst/>
@@ -5055,35 +5157,159 @@
           <a:noFill/>
         </p:spPr>
         <p:txBody>
-          <a:bodyPr wrap="square" rtlCol="0">
+          <a:bodyPr wrap="none" rtlCol="0">
             <a:spAutoFit/>
           </a:bodyPr>
           <a:p>
             <a:r>
               <a:rPr lang="zh-CN" altLang="en-US"/>
-              <a:t>工作后的一到两年内，能够积累项目的开发经验，接触更多的相同方面的人才</a:t>
-            </a:r>
-            <a:endParaRPr lang="zh-CN" altLang="en-US"/>
-          </a:p>
-          <a:p>
-            <a:r>
-              <a:rPr lang="zh-CN" altLang="zh-CN"/>
-              <a:t>技术的提高黄金期间，除了实际的项目开发，结识一大帮志同道合的朋友切磋技艺，共同奋斗</a:t>
-            </a:r>
-            <a:endParaRPr lang="zh-CN" altLang="zh-CN"/>
-          </a:p>
-          <a:p>
+              <a:t>中的想法：时间有限，对待学业不求高等水平，中等水平就好</a:t>
+            </a:r>
             <a:endParaRPr lang="zh-CN" altLang="en-US"/>
           </a:p>
           <a:p>
             <a:r>
               <a:rPr lang="zh-CN" altLang="en-US"/>
-              <a:t>工作后三到四年内，能够担任开发小组的小组长，培养自己的开发团队。熟悉整个开发项目的架构设计和流程。</a:t>
-            </a:r>
-            <a:endParaRPr lang="zh-CN" altLang="en-US"/>
-          </a:p>
-          <a:p>
-            <a:endParaRPr lang="zh-CN" altLang="en-US"/>
+              <a:t>更多时间在实际的运用开发中</a:t>
+            </a:r>
+            <a:endParaRPr lang="zh-CN" altLang="en-US"/>
+          </a:p>
+          <a:p>
+            <a:r>
+              <a:rPr lang="zh-CN" altLang="en-US"/>
+              <a:t>具体规划：</a:t>
+            </a:r>
+            <a:endParaRPr lang="zh-CN" altLang="en-US"/>
+          </a:p>
+          <a:p>
+            <a:r>
+              <a:rPr lang="zh-CN" altLang="en-US"/>
+              <a:t>大一大三上基本上能够将所有主要的课程选修完成，</a:t>
+            </a:r>
+            <a:endParaRPr lang="zh-CN" altLang="en-US"/>
+          </a:p>
+          <a:p>
+            <a:r>
+              <a:rPr lang="en-US" altLang="zh-CN"/>
+              <a:t>	</a:t>
+            </a:r>
+            <a:r>
+              <a:rPr lang="zh-CN" altLang="en-US"/>
+              <a:t>计网、</a:t>
+            </a:r>
+            <a:r>
+              <a:rPr lang="en-US" altLang="zh-CN"/>
+              <a:t>linux</a:t>
+            </a:r>
+            <a:r>
+              <a:rPr lang="zh-CN" altLang="en-US"/>
+              <a:t>网络编程、</a:t>
+            </a:r>
+            <a:r>
+              <a:rPr lang="en-US" altLang="zh-CN"/>
+              <a:t>linux</a:t>
+            </a:r>
+            <a:r>
+              <a:rPr lang="zh-CN" altLang="en-US"/>
+              <a:t>运用开发、几门公选课</a:t>
+            </a:r>
+            <a:endParaRPr lang="zh-CN" altLang="en-US"/>
+          </a:p>
+          <a:p>
+            <a:r>
+              <a:rPr lang="zh-CN" altLang="en-US"/>
+              <a:t>同时具备基本的企业的工具的使用，</a:t>
+            </a:r>
+            <a:endParaRPr lang="zh-CN" altLang="en-US"/>
+          </a:p>
+          <a:p>
+            <a:r>
+              <a:rPr lang="en-US" altLang="zh-CN"/>
+              <a:t>	</a:t>
+            </a:r>
+            <a:r>
+              <a:rPr lang="zh-CN" altLang="en-US"/>
+              <a:t>编程语言的能力、工具的使用</a:t>
+            </a:r>
+            <a:r>
+              <a:rPr lang="en-US" altLang="zh-CN"/>
+              <a:t>(</a:t>
+            </a:r>
+            <a:r>
+              <a:rPr lang="zh-CN" altLang="en-US"/>
+              <a:t>云平台</a:t>
+            </a:r>
+            <a:r>
+              <a:rPr lang="en-US" altLang="zh-CN"/>
+              <a:t>)</a:t>
+            </a:r>
+            <a:endParaRPr lang="en-US" altLang="zh-CN"/>
+          </a:p>
+          <a:p>
+            <a:r>
+              <a:rPr lang="zh-CN" altLang="en-US"/>
+              <a:t>基本的运用开发的能力</a:t>
+            </a:r>
+            <a:endParaRPr lang="zh-CN" altLang="en-US"/>
+          </a:p>
+          <a:p>
+            <a:r>
+              <a:rPr lang="en-US" altLang="zh-CN"/>
+              <a:t>	</a:t>
+            </a:r>
+            <a:r>
+              <a:rPr lang="zh-CN" altLang="en-US"/>
+              <a:t>制作一些小型的项目、阅读一些高质量的源程序的代码</a:t>
+            </a:r>
+            <a:endParaRPr lang="zh-CN" altLang="en-US"/>
+          </a:p>
+          <a:p>
+            <a:r>
+              <a:rPr lang="zh-CN" altLang="en-US"/>
+              <a:t>大三进入导师实验室进行项目开发工作</a:t>
+            </a:r>
+            <a:endParaRPr lang="zh-CN" altLang="en-US"/>
+          </a:p>
+          <a:p>
+            <a:r>
+              <a:rPr lang="en-US" altLang="zh-CN"/>
+              <a:t>	</a:t>
+            </a:r>
+            <a:r>
+              <a:rPr lang="zh-CN" altLang="en-US"/>
+              <a:t>主要是从事云计算方面、网易公司合作或者是实习</a:t>
+            </a:r>
+            <a:endParaRPr lang="zh-CN" altLang="en-US"/>
+          </a:p>
+          <a:p>
+            <a:r>
+              <a:rPr lang="zh-CN" altLang="en-US"/>
+              <a:t>大四进入企业实习</a:t>
+            </a:r>
+            <a:endParaRPr lang="zh-CN" altLang="en-US"/>
+          </a:p>
+          <a:p>
+            <a:r>
+              <a:rPr lang="en-US" altLang="zh-CN"/>
+              <a:t>	</a:t>
+            </a:r>
+            <a:r>
+              <a:rPr lang="zh-CN" altLang="en-US"/>
+              <a:t>留在网易，不行的话选择一些国内的云平台</a:t>
+            </a:r>
+            <a:r>
+              <a:rPr lang="en-US" altLang="zh-CN"/>
+              <a:t>(</a:t>
+            </a:r>
+            <a:r>
+              <a:rPr lang="zh-CN" altLang="en-US"/>
+              <a:t>阿里、九州云、青云之类的</a:t>
+            </a:r>
+            <a:r>
+              <a:rPr lang="en-US" altLang="zh-CN"/>
+              <a:t>)</a:t>
+            </a:r>
+            <a:endParaRPr lang="en-US" altLang="zh-CN"/>
           </a:p>
         </p:txBody>
       </p:sp>
@@ -5314,7 +5540,7 @@
           <a:p>
             <a:r>
               <a:rPr lang="zh-CN" altLang="en-US" dirty="0" smtClean="0"/>
-              <a:t>长期规划：</a:t>
+              <a:t>中期规划（工作前三四年的样子）：</a:t>
             </a:r>
             <a:endParaRPr lang="zh-CN" altLang="en-US" dirty="0"/>
           </a:p>
@@ -5322,14 +5548,14 @@
       </p:sp>
       <p:sp>
         <p:nvSpPr>
-          <p:cNvPr id="2" name="文本框 1"/>
+          <p:cNvPr id="4" name="文本框 3"/>
           <p:cNvSpPr txBox="1"/>
           <p:nvPr/>
         </p:nvSpPr>
         <p:spPr>
           <a:xfrm>
-            <a:off x="2152650" y="2776855"/>
-            <a:ext cx="5588000" cy="914400"/>
+            <a:off x="1705610" y="2473960"/>
+            <a:ext cx="5963285" cy="2286000"/>
           </a:xfrm>
           <a:prstGeom prst="rect">
             <a:avLst/>
@@ -5343,8 +5569,28 @@
           <a:p>
             <a:r>
               <a:rPr lang="zh-CN" altLang="en-US"/>
-              <a:t>就本身的工作位置而言，如果企业发展方向以及处事方面和自己兴趣合得来，选择继续在企业中工作；反之，考虑和小伙伴出去创业，出去闯闯</a:t>
-            </a:r>
+              <a:t>工作后的一到两年内，能够积累项目的开发经验，接触更多的相同方面的人才</a:t>
+            </a:r>
+            <a:endParaRPr lang="zh-CN" altLang="en-US"/>
+          </a:p>
+          <a:p>
+            <a:r>
+              <a:rPr lang="zh-CN" altLang="zh-CN"/>
+              <a:t>技术的提高黄金期间，除了实际的项目开发，结识一大帮志同道合的朋友切磋技艺，共同奋斗</a:t>
+            </a:r>
+            <a:endParaRPr lang="zh-CN" altLang="zh-CN"/>
+          </a:p>
+          <a:p>
+            <a:endParaRPr lang="zh-CN" altLang="en-US"/>
+          </a:p>
+          <a:p>
+            <a:r>
+              <a:rPr lang="zh-CN" altLang="en-US"/>
+              <a:t>工作后三到四年内，能够担任开发小组的小组长，培养自己的开发团队。熟悉整个开发项目的架构设计和流程。</a:t>
+            </a:r>
+            <a:endParaRPr lang="zh-CN" altLang="en-US"/>
+          </a:p>
+          <a:p>
             <a:endParaRPr lang="zh-CN" altLang="en-US"/>
           </a:p>
         </p:txBody>
@@ -5368,6 +5614,268 @@
 </file>
 
 <file path=ppt/slides/slide5.xml><?xml version="1.0" encoding="utf-8"?>
+<p:sld xmlns:a="http://schemas.openxmlformats.org/drawingml/2006/main" xmlns:r="http://schemas.openxmlformats.org/officeDocument/2006/relationships" xmlns:p="http://schemas.openxmlformats.org/presentationml/2006/main">
+  <p:cSld>
+    <p:spTree>
+      <p:nvGrpSpPr>
+        <p:cNvPr id="1" name=""/>
+        <p:cNvGrpSpPr/>
+        <p:nvPr/>
+      </p:nvGrpSpPr>
+      <p:grpSpPr>
+        <a:xfrm>
+          <a:off x="0" y="0"/>
+          <a:ext cx="0" cy="0"/>
+          <a:chOff x="0" y="0"/>
+          <a:chExt cx="0" cy="0"/>
+        </a:xfrm>
+      </p:grpSpPr>
+      <p:sp>
+        <p:nvSpPr>
+          <p:cNvPr id="3" name="副标题 2"/>
+          <p:cNvSpPr>
+            <a:spLocks noGrp="1"/>
+          </p:cNvSpPr>
+          <p:nvPr>
+            <p:ph type="subTitle" idx="1"/>
+          </p:nvPr>
+        </p:nvSpPr>
+        <p:spPr>
+          <a:xfrm>
+            <a:off x="0" y="1142984"/>
+            <a:ext cx="8715404" cy="4500594"/>
+          </a:xfrm>
+        </p:spPr>
+        <p:txBody>
+          <a:bodyPr/>
+          <a:lstStyle/>
+          <a:p>
+            <a:endParaRPr lang="zh-CN" altLang="en-US" dirty="0"/>
+          </a:p>
+        </p:txBody>
+      </p:sp>
+      <p:sp>
+        <p:nvSpPr>
+          <p:cNvPr id="28" name="矩形 27"/>
+          <p:cNvSpPr/>
+          <p:nvPr/>
+        </p:nvSpPr>
+        <p:spPr>
+          <a:xfrm>
+            <a:off x="0" y="6669360"/>
+            <a:ext cx="9144000" cy="188640"/>
+          </a:xfrm>
+          <a:prstGeom prst="rect">
+            <a:avLst/>
+          </a:prstGeom>
+          <a:solidFill>
+            <a:schemeClr val="accent2"/>
+          </a:solidFill>
+          <a:ln>
+            <a:noFill/>
+          </a:ln>
+        </p:spPr>
+        <p:style>
+          <a:lnRef idx="2">
+            <a:schemeClr val="accent1">
+              <a:shade val="50000"/>
+            </a:schemeClr>
+          </a:lnRef>
+          <a:fillRef idx="1">
+            <a:schemeClr val="accent1"/>
+          </a:fillRef>
+          <a:effectRef idx="0">
+            <a:schemeClr val="accent1"/>
+          </a:effectRef>
+          <a:fontRef idx="minor">
+            <a:schemeClr val="lt1"/>
+          </a:fontRef>
+        </p:style>
+        <p:txBody>
+          <a:bodyPr rtlCol="0" anchor="ctr"/>
+          <a:lstStyle/>
+          <a:p>
+            <a:pPr algn="ctr"/>
+            <a:endParaRPr lang="zh-CN" altLang="en-US">
+              <a:solidFill>
+                <a:schemeClr val="accent2"/>
+              </a:solidFill>
+            </a:endParaRPr>
+          </a:p>
+        </p:txBody>
+      </p:sp>
+      <p:sp>
+        <p:nvSpPr>
+          <p:cNvPr id="31" name="TextBox 30"/>
+          <p:cNvSpPr txBox="1"/>
+          <p:nvPr/>
+        </p:nvSpPr>
+        <p:spPr>
+          <a:xfrm>
+            <a:off x="246876" y="6289575"/>
+            <a:ext cx="1667444" cy="307777"/>
+          </a:xfrm>
+          <a:prstGeom prst="rect">
+            <a:avLst/>
+          </a:prstGeom>
+          <a:noFill/>
+        </p:spPr>
+        <p:txBody>
+          <a:bodyPr wrap="none" rtlCol="0">
+            <a:spAutoFit/>
+          </a:bodyPr>
+          <a:lstStyle/>
+          <a:p>
+            <a:r>
+              <a:rPr lang="en-US" altLang="zh-CN" sz="1400" dirty="0" smtClean="0">
+                <a:solidFill>
+                  <a:schemeClr val="bg1"/>
+                </a:solidFill>
+                <a:latin typeface="Mistral" pitchFamily="66" charset="0"/>
+              </a:rPr>
+              <a:t>Yvonne’s Career Planning</a:t>
+            </a:r>
+            <a:endParaRPr lang="zh-CN" altLang="en-US" sz="1400" dirty="0">
+              <a:solidFill>
+                <a:schemeClr val="bg1"/>
+              </a:solidFill>
+              <a:latin typeface="Mistral" pitchFamily="66" charset="0"/>
+            </a:endParaRPr>
+          </a:p>
+        </p:txBody>
+      </p:sp>
+      <p:pic>
+        <p:nvPicPr>
+          <p:cNvPr id="53" name="Imagen 3" descr="C:\Users\Design\Documents\Edu\Product Launch\magic_wand.png"/>
+          <p:cNvPicPr>
+            <a:picLocks noChangeAspect="1" noChangeArrowheads="1"/>
+          </p:cNvPicPr>
+          <p:nvPr/>
+        </p:nvPicPr>
+        <p:blipFill>
+          <a:blip r:embed="rId1" cstate="print">
+            <a:extLst>
+              <a:ext uri="{28A0092B-C50C-407E-A947-70E740481C1C}">
+                <a14:useLocalDpi xmlns:a14="http://schemas.microsoft.com/office/drawing/2010/main" val="0"/>
+              </a:ext>
+            </a:extLst>
+          </a:blip>
+          <a:srcRect/>
+          <a:stretch>
+            <a:fillRect/>
+          </a:stretch>
+        </p:blipFill>
+        <p:spPr bwMode="auto">
+          <a:xfrm>
+            <a:off x="6516216" y="1268760"/>
+            <a:ext cx="457200" cy="457200"/>
+          </a:xfrm>
+          <a:prstGeom prst="rect">
+            <a:avLst/>
+          </a:prstGeom>
+          <a:noFill/>
+          <a:ln>
+            <a:noFill/>
+          </a:ln>
+          <a:extLst>
+            <a:ext uri="{909E8E84-426E-40DD-AFC4-6F175D3DCCD1}">
+              <a14:hiddenFill xmlns:a14="http://schemas.microsoft.com/office/drawing/2010/main">
+                <a:solidFill>
+                  <a:srgbClr val="FFFFFF"/>
+                </a:solidFill>
+              </a14:hiddenFill>
+            </a:ext>
+            <a:ext uri="{91240B29-F687-4F45-9708-019B960494DF}">
+              <a14:hiddenLine xmlns:a14="http://schemas.microsoft.com/office/drawing/2010/main" w="9525">
+                <a:solidFill>
+                  <a:srgbClr val="000000"/>
+                </a:solidFill>
+                <a:miter lim="800000"/>
+                <a:headEnd/>
+                <a:tailEnd/>
+              </a14:hiddenLine>
+            </a:ext>
+          </a:extLst>
+        </p:spPr>
+      </p:pic>
+      <p:sp>
+        <p:nvSpPr>
+          <p:cNvPr id="9" name="标题 8"/>
+          <p:cNvSpPr>
+            <a:spLocks noGrp="1"/>
+          </p:cNvSpPr>
+          <p:nvPr>
+            <p:ph type="ctrTitle"/>
+          </p:nvPr>
+        </p:nvSpPr>
+        <p:spPr>
+          <a:xfrm>
+            <a:off x="285720" y="428605"/>
+            <a:ext cx="4286280" cy="642941"/>
+          </a:xfrm>
+        </p:spPr>
+        <p:txBody>
+          <a:bodyPr>
+            <a:normAutofit fontScale="90000"/>
+          </a:bodyPr>
+          <a:lstStyle/>
+          <a:p>
+            <a:r>
+              <a:rPr lang="zh-CN" altLang="en-US" dirty="0" smtClean="0"/>
+              <a:t>长期规划：</a:t>
+            </a:r>
+            <a:endParaRPr lang="zh-CN" altLang="en-US" dirty="0"/>
+          </a:p>
+        </p:txBody>
+      </p:sp>
+      <p:sp>
+        <p:nvSpPr>
+          <p:cNvPr id="2" name="文本框 1"/>
+          <p:cNvSpPr txBox="1"/>
+          <p:nvPr/>
+        </p:nvSpPr>
+        <p:spPr>
+          <a:xfrm>
+            <a:off x="2152650" y="2776855"/>
+            <a:ext cx="5588000" cy="914400"/>
+          </a:xfrm>
+          <a:prstGeom prst="rect">
+            <a:avLst/>
+          </a:prstGeom>
+          <a:noFill/>
+        </p:spPr>
+        <p:txBody>
+          <a:bodyPr wrap="square" rtlCol="0">
+            <a:spAutoFit/>
+          </a:bodyPr>
+          <a:p>
+            <a:r>
+              <a:rPr lang="zh-CN" altLang="en-US"/>
+              <a:t>就本身的工作位置而言，如果企业发展方向以及处事方面和自己兴趣合得来，选择继续在企业中工作；反之，考虑和小伙伴出去创业，出去闯闯</a:t>
+            </a:r>
+            <a:endParaRPr lang="zh-CN" altLang="en-US"/>
+          </a:p>
+        </p:txBody>
+      </p:sp>
+    </p:spTree>
+  </p:cSld>
+  <p:clrMapOvr>
+    <a:masterClrMapping/>
+  </p:clrMapOvr>
+  <p:transition spd="med">
+    <p:fade thruBlk="1"/>
+  </p:transition>
+  <p:timing>
+    <p:tnLst>
+      <p:par>
+        <p:cTn id="1" dur="indefinite" restart="never" nodeType="tmRoot"/>
+      </p:par>
+    </p:tnLst>
+  </p:timing>
+</p:sld>
+</file>
+
+<file path=ppt/slides/slide6.xml><?xml version="1.0" encoding="utf-8"?>
 <p:sld xmlns:a="http://schemas.openxmlformats.org/drawingml/2006/main" xmlns:r="http://schemas.openxmlformats.org/officeDocument/2006/relationships" xmlns:p="http://schemas.openxmlformats.org/presentationml/2006/main">
   <p:cSld>
     <p:spTree>

</xml_diff>